<commit_message>
Legend and images added
</commit_message>
<xml_diff>
--- a/Assignments/Gradebook App PowerPont/Austin Brand/Javascript Gradebook Storyboard.pptx
+++ b/Assignments/Gradebook App PowerPont/Austin Brand/Javascript Gradebook Storyboard.pptx
@@ -7,6 +7,7 @@
   <p:sldIdLst>
     <p:sldId id="256" r:id="rId2"/>
     <p:sldId id="257" r:id="rId3"/>
+    <p:sldId id="258" r:id="rId4"/>
   </p:sldIdLst>
   <p:sldSz cx="9144000" cy="6858000" type="screen4x3"/>
   <p:notesSz cx="6858000" cy="9144000"/>
@@ -3897,6 +3898,47 @@
           </a:p>
         </p:txBody>
       </p:sp>
+      <p:pic>
+        <p:nvPicPr>
+          <p:cNvPr id="3074" name="Picture 2" descr="http://spusurigao.edu.ph/studentportal/Styles/images/gradebook%20icon.png"/>
+          <p:cNvPicPr>
+            <a:picLocks noChangeAspect="1" noChangeArrowheads="1"/>
+          </p:cNvPicPr>
+          <p:nvPr/>
+        </p:nvPicPr>
+        <p:blipFill>
+          <a:blip r:embed="rId2">
+            <a:extLst>
+              <a:ext uri="{28A0092B-C50C-407E-A947-70E740481C1C}">
+                <a14:useLocalDpi xmlns:a14="http://schemas.microsoft.com/office/drawing/2010/main" val="0"/>
+              </a:ext>
+            </a:extLst>
+          </a:blip>
+          <a:srcRect/>
+          <a:stretch>
+            <a:fillRect/>
+          </a:stretch>
+        </p:blipFill>
+        <p:spPr bwMode="auto">
+          <a:xfrm>
+            <a:off x="38100" y="51707"/>
+            <a:ext cx="2019300" cy="1015093"/>
+          </a:xfrm>
+          <a:prstGeom prst="rect">
+            <a:avLst/>
+          </a:prstGeom>
+          <a:noFill/>
+          <a:extLst>
+            <a:ext uri="{909E8E84-426E-40DD-AFC4-6F175D3DCCD1}">
+              <a14:hiddenFill xmlns:a14="http://schemas.microsoft.com/office/drawing/2010/main">
+                <a:solidFill>
+                  <a:srgbClr val="FFFFFF"/>
+                </a:solidFill>
+              </a14:hiddenFill>
+            </a:ext>
+          </a:extLst>
+        </p:spPr>
+      </p:pic>
     </p:spTree>
     <p:extLst>
       <p:ext uri="{BB962C8B-B14F-4D97-AF65-F5344CB8AC3E}">
@@ -4269,10 +4311,272 @@
           </a:extLst>
         </p:spPr>
       </p:pic>
+      <p:pic>
+        <p:nvPicPr>
+          <p:cNvPr id="1028" name="Picture 4" descr="http://icons.iconarchive.com/icons/artua/mac/512/Home-icon.png"/>
+          <p:cNvPicPr>
+            <a:picLocks noChangeAspect="1" noChangeArrowheads="1"/>
+          </p:cNvPicPr>
+          <p:nvPr/>
+        </p:nvPicPr>
+        <p:blipFill>
+          <a:blip r:embed="rId3" cstate="print">
+            <a:extLst>
+              <a:ext uri="{28A0092B-C50C-407E-A947-70E740481C1C}">
+                <a14:useLocalDpi xmlns:a14="http://schemas.microsoft.com/office/drawing/2010/main" val="0"/>
+              </a:ext>
+            </a:extLst>
+          </a:blip>
+          <a:srcRect/>
+          <a:stretch>
+            <a:fillRect/>
+          </a:stretch>
+        </p:blipFill>
+        <p:spPr bwMode="auto">
+          <a:xfrm>
+            <a:off x="2699905" y="-29972"/>
+            <a:ext cx="1866900" cy="1249172"/>
+          </a:xfrm>
+          <a:prstGeom prst="rect">
+            <a:avLst/>
+          </a:prstGeom>
+          <a:noFill/>
+          <a:extLst>
+            <a:ext uri="{909E8E84-426E-40DD-AFC4-6F175D3DCCD1}">
+              <a14:hiddenFill xmlns:a14="http://schemas.microsoft.com/office/drawing/2010/main">
+                <a:solidFill>
+                  <a:srgbClr val="FFFFFF"/>
+                </a:solidFill>
+              </a14:hiddenFill>
+            </a:ext>
+          </a:extLst>
+        </p:spPr>
+      </p:pic>
     </p:spTree>
     <p:extLst>
       <p:ext uri="{BB962C8B-B14F-4D97-AF65-F5344CB8AC3E}">
         <p14:creationId xmlns:p14="http://schemas.microsoft.com/office/powerpoint/2010/main" val="2768272039"/>
+      </p:ext>
+    </p:extLst>
+  </p:cSld>
+  <p:clrMapOvr>
+    <a:masterClrMapping/>
+  </p:clrMapOvr>
+  <p:timing>
+    <p:tnLst>
+      <p:par>
+        <p:cTn id="1" dur="indefinite" restart="never" nodeType="tmRoot"/>
+      </p:par>
+    </p:tnLst>
+  </p:timing>
+</p:sld>
+</file>
+
+<file path=ppt/slides/slide3.xml><?xml version="1.0" encoding="utf-8"?>
+<p:sld xmlns:a="http://schemas.openxmlformats.org/drawingml/2006/main" xmlns:r="http://schemas.openxmlformats.org/officeDocument/2006/relationships" xmlns:p="http://schemas.openxmlformats.org/presentationml/2006/main">
+  <p:cSld>
+    <p:spTree>
+      <p:nvGrpSpPr>
+        <p:cNvPr id="1" name=""/>
+        <p:cNvGrpSpPr/>
+        <p:nvPr/>
+      </p:nvGrpSpPr>
+      <p:grpSpPr>
+        <a:xfrm>
+          <a:off x="0" y="0"/>
+          <a:ext cx="0" cy="0"/>
+          <a:chOff x="0" y="0"/>
+          <a:chExt cx="0" cy="0"/>
+        </a:xfrm>
+      </p:grpSpPr>
+      <p:sp>
+        <p:nvSpPr>
+          <p:cNvPr id="2" name="TextBox 1"/>
+          <p:cNvSpPr txBox="1"/>
+          <p:nvPr/>
+        </p:nvSpPr>
+        <p:spPr>
+          <a:xfrm>
+            <a:off x="685800" y="457200"/>
+            <a:ext cx="7315200" cy="1107996"/>
+          </a:xfrm>
+          <a:prstGeom prst="rect">
+            <a:avLst/>
+          </a:prstGeom>
+        </p:spPr>
+        <p:style>
+          <a:lnRef idx="0">
+            <a:scrgbClr r="0" g="0" b="0"/>
+          </a:lnRef>
+          <a:fillRef idx="1003">
+            <a:schemeClr val="dk1"/>
+          </a:fillRef>
+          <a:effectRef idx="0">
+            <a:scrgbClr r="0" g="0" b="0"/>
+          </a:effectRef>
+          <a:fontRef idx="major"/>
+        </p:style>
+        <p:txBody>
+          <a:bodyPr wrap="square" rtlCol="0">
+            <a:spAutoFit/>
+          </a:bodyPr>
+          <a:lstStyle/>
+          <a:p>
+            <a:pPr algn="ctr"/>
+            <a:r>
+              <a:rPr lang="en-US" sz="6600" dirty="0" smtClean="0"/>
+              <a:t>Legend</a:t>
+            </a:r>
+            <a:endParaRPr lang="en-US" sz="6600" dirty="0"/>
+          </a:p>
+        </p:txBody>
+      </p:sp>
+      <p:pic>
+        <p:nvPicPr>
+          <p:cNvPr id="2050" name="Picture 2" descr="http://icons.iconarchive.com/icons/artua/mac/512/Home-icon.png"/>
+          <p:cNvPicPr>
+            <a:picLocks noChangeAspect="1" noChangeArrowheads="1"/>
+          </p:cNvPicPr>
+          <p:nvPr/>
+        </p:nvPicPr>
+        <p:blipFill>
+          <a:blip r:embed="rId2" cstate="print">
+            <a:extLst>
+              <a:ext uri="{28A0092B-C50C-407E-A947-70E740481C1C}">
+                <a14:useLocalDpi xmlns:a14="http://schemas.microsoft.com/office/drawing/2010/main" val="0"/>
+              </a:ext>
+            </a:extLst>
+          </a:blip>
+          <a:srcRect/>
+          <a:stretch>
+            <a:fillRect/>
+          </a:stretch>
+        </p:blipFill>
+        <p:spPr bwMode="auto">
+          <a:xfrm>
+            <a:off x="297873" y="2895600"/>
+            <a:ext cx="1143000" cy="1143000"/>
+          </a:xfrm>
+          <a:prstGeom prst="rect">
+            <a:avLst/>
+          </a:prstGeom>
+          <a:noFill/>
+          <a:extLst>
+            <a:ext uri="{909E8E84-426E-40DD-AFC4-6F175D3DCCD1}">
+              <a14:hiddenFill xmlns:a14="http://schemas.microsoft.com/office/drawing/2010/main">
+                <a:solidFill>
+                  <a:srgbClr val="FFFFFF"/>
+                </a:solidFill>
+              </a14:hiddenFill>
+            </a:ext>
+          </a:extLst>
+        </p:spPr>
+      </p:pic>
+      <p:sp>
+        <p:nvSpPr>
+          <p:cNvPr id="3" name="TextBox 2"/>
+          <p:cNvSpPr txBox="1"/>
+          <p:nvPr/>
+        </p:nvSpPr>
+        <p:spPr>
+          <a:xfrm>
+            <a:off x="1752600" y="3276600"/>
+            <a:ext cx="3352800" cy="461665"/>
+          </a:xfrm>
+          <a:prstGeom prst="rect">
+            <a:avLst/>
+          </a:prstGeom>
+          <a:noFill/>
+        </p:spPr>
+        <p:txBody>
+          <a:bodyPr wrap="square" rtlCol="0">
+            <a:spAutoFit/>
+          </a:bodyPr>
+          <a:lstStyle/>
+          <a:p>
+            <a:r>
+              <a:rPr lang="en-US" sz="2400" dirty="0" smtClean="0"/>
+              <a:t>Takes you to homepage</a:t>
+            </a:r>
+            <a:endParaRPr lang="en-US" sz="2400" dirty="0"/>
+          </a:p>
+        </p:txBody>
+      </p:sp>
+      <p:pic>
+        <p:nvPicPr>
+          <p:cNvPr id="2052" name="Picture 4" descr="http://spusurigao.edu.ph/studentportal/Styles/images/gradebook%20icon.png"/>
+          <p:cNvPicPr>
+            <a:picLocks noChangeAspect="1" noChangeArrowheads="1"/>
+          </p:cNvPicPr>
+          <p:nvPr/>
+        </p:nvPicPr>
+        <p:blipFill>
+          <a:blip r:embed="rId3" cstate="print">
+            <a:extLst>
+              <a:ext uri="{28A0092B-C50C-407E-A947-70E740481C1C}">
+                <a14:useLocalDpi xmlns:a14="http://schemas.microsoft.com/office/drawing/2010/main" val="0"/>
+              </a:ext>
+            </a:extLst>
+          </a:blip>
+          <a:srcRect/>
+          <a:stretch>
+            <a:fillRect/>
+          </a:stretch>
+        </p:blipFill>
+        <p:spPr bwMode="auto">
+          <a:xfrm>
+            <a:off x="330448" y="4267201"/>
+            <a:ext cx="1201223" cy="1066800"/>
+          </a:xfrm>
+          <a:prstGeom prst="rect">
+            <a:avLst/>
+          </a:prstGeom>
+          <a:noFill/>
+          <a:extLst>
+            <a:ext uri="{909E8E84-426E-40DD-AFC4-6F175D3DCCD1}">
+              <a14:hiddenFill xmlns:a14="http://schemas.microsoft.com/office/drawing/2010/main">
+                <a:solidFill>
+                  <a:srgbClr val="FFFFFF"/>
+                </a:solidFill>
+              </a14:hiddenFill>
+            </a:ext>
+          </a:extLst>
+        </p:spPr>
+      </p:pic>
+      <p:sp>
+        <p:nvSpPr>
+          <p:cNvPr id="4" name="TextBox 3"/>
+          <p:cNvSpPr txBox="1"/>
+          <p:nvPr/>
+        </p:nvSpPr>
+        <p:spPr>
+          <a:xfrm>
+            <a:off x="1828800" y="4495800"/>
+            <a:ext cx="2743200" cy="369332"/>
+          </a:xfrm>
+          <a:prstGeom prst="rect">
+            <a:avLst/>
+          </a:prstGeom>
+          <a:noFill/>
+        </p:spPr>
+        <p:txBody>
+          <a:bodyPr wrap="square" rtlCol="0">
+            <a:spAutoFit/>
+          </a:bodyPr>
+          <a:lstStyle/>
+          <a:p>
+            <a:r>
+              <a:rPr lang="en-US" dirty="0" smtClean="0"/>
+              <a:t>Just an icon for Gradebook</a:t>
+            </a:r>
+            <a:endParaRPr lang="en-US" dirty="0"/>
+          </a:p>
+        </p:txBody>
+      </p:sp>
+    </p:spTree>
+    <p:extLst>
+      <p:ext uri="{BB962C8B-B14F-4D97-AF65-F5344CB8AC3E}">
+        <p14:creationId xmlns:p14="http://schemas.microsoft.com/office/powerpoint/2010/main" val="1410605455"/>
       </p:ext>
     </p:extLst>
   </p:cSld>

</xml_diff>

<commit_message>
Progress so far, classes tab done
</commit_message>
<xml_diff>
--- a/Assignments/Gradebook App PowerPont/Austin Brand/Javascript Gradebook Storyboard.pptx
+++ b/Assignments/Gradebook App PowerPont/Austin Brand/Javascript Gradebook Storyboard.pptx
@@ -7,7 +7,8 @@
   <p:sldIdLst>
     <p:sldId id="256" r:id="rId2"/>
     <p:sldId id="257" r:id="rId3"/>
-    <p:sldId id="258" r:id="rId4"/>
+    <p:sldId id="259" r:id="rId4"/>
+    <p:sldId id="258" r:id="rId5"/>
   </p:sldIdLst>
   <p:sldSz cx="9144000" cy="6858000" type="screen4x3"/>
   <p:notesSz cx="6858000" cy="9144000"/>
@@ -3667,53 +3668,13 @@
       </p:sp>
       <p:sp>
         <p:nvSpPr>
-          <p:cNvPr id="8" name="Rectangle 7"/>
-          <p:cNvSpPr/>
-          <p:nvPr/>
-        </p:nvSpPr>
-        <p:spPr>
-          <a:xfrm>
-            <a:off x="0" y="1066800"/>
-            <a:ext cx="2286000" cy="4648200"/>
-          </a:xfrm>
-          <a:prstGeom prst="rect">
-            <a:avLst/>
-          </a:prstGeom>
-        </p:spPr>
-        <p:style>
-          <a:lnRef idx="2">
-            <a:schemeClr val="dk1">
-              <a:shade val="50000"/>
-            </a:schemeClr>
-          </a:lnRef>
-          <a:fillRef idx="1">
-            <a:schemeClr val="dk1"/>
-          </a:fillRef>
-          <a:effectRef idx="0">
-            <a:schemeClr val="dk1"/>
-          </a:effectRef>
-          <a:fontRef idx="minor">
-            <a:schemeClr val="lt1"/>
-          </a:fontRef>
-        </p:style>
-        <p:txBody>
-          <a:bodyPr rtlCol="0" anchor="ctr"/>
-          <a:lstStyle/>
-          <a:p>
-            <a:pPr algn="ctr"/>
-            <a:endParaRPr lang="en-US"/>
-          </a:p>
-        </p:txBody>
-      </p:sp>
-      <p:sp>
-        <p:nvSpPr>
           <p:cNvPr id="11" name="TextBox 10"/>
           <p:cNvSpPr txBox="1"/>
           <p:nvPr/>
         </p:nvSpPr>
         <p:spPr>
           <a:xfrm>
-            <a:off x="2514600" y="1295400"/>
+            <a:off x="1071995" y="1295400"/>
             <a:ext cx="6386945" cy="1938992"/>
           </a:xfrm>
           <a:prstGeom prst="rect">
@@ -3740,6 +3701,7 @@
           </a:bodyPr>
           <a:lstStyle/>
           <a:p>
+            <a:pPr algn="ctr"/>
             <a:r>
               <a:rPr lang="en-US" sz="2400" dirty="0" smtClean="0"/>
               <a:t>Hello, and welcome to the Gradebook Guru.</a:t>
@@ -3772,8 +3734,8 @@
         </p:nvSpPr>
         <p:spPr>
           <a:xfrm>
-            <a:off x="2514600" y="3390900"/>
-            <a:ext cx="2971800" cy="769441"/>
+            <a:off x="1071995" y="3390900"/>
+            <a:ext cx="3054096" cy="769441"/>
           </a:xfrm>
           <a:prstGeom prst="rect">
             <a:avLst/>
@@ -3819,7 +3781,7 @@
         </p:nvSpPr>
         <p:spPr>
           <a:xfrm>
-            <a:off x="5708072" y="3390900"/>
+            <a:off x="4404012" y="3390900"/>
             <a:ext cx="3054928" cy="769441"/>
           </a:xfrm>
           <a:prstGeom prst="rect">
@@ -3862,8 +3824,8 @@
         </p:nvSpPr>
         <p:spPr>
           <a:xfrm>
-            <a:off x="2514600" y="4648200"/>
-            <a:ext cx="6248400" cy="830997"/>
+            <a:off x="1071995" y="4641273"/>
+            <a:ext cx="6386945" cy="830997"/>
           </a:xfrm>
           <a:prstGeom prst="rect">
             <a:avLst/>
@@ -4104,8 +4066,8 @@
         </p:nvSpPr>
         <p:spPr>
           <a:xfrm>
-            <a:off x="221673" y="2514599"/>
-            <a:ext cx="1905000" cy="521208"/>
+            <a:off x="235527" y="3352800"/>
+            <a:ext cx="1905000" cy="461665"/>
           </a:xfrm>
           <a:prstGeom prst="rect">
             <a:avLst/>
@@ -4134,7 +4096,7 @@
             <a:pPr algn="ctr"/>
             <a:r>
               <a:rPr lang="en-US" sz="2400" dirty="0" smtClean="0"/>
-              <a:t>Student Info</a:t>
+              <a:t>Teacher Info</a:t>
             </a:r>
             <a:endParaRPr lang="en-US" sz="2400" dirty="0"/>
           </a:p>
@@ -4148,7 +4110,7 @@
         </p:nvSpPr>
         <p:spPr>
           <a:xfrm>
-            <a:off x="228600" y="3505200"/>
+            <a:off x="221673" y="5181600"/>
             <a:ext cx="1898073" cy="707886"/>
           </a:xfrm>
           <a:prstGeom prst="rect">
@@ -4178,7 +4140,7 @@
             <a:pPr algn="ctr"/>
             <a:r>
               <a:rPr lang="en-US" sz="2000" dirty="0" smtClean="0"/>
-              <a:t>Student Course History</a:t>
+              <a:t>Teacher Course History</a:t>
             </a:r>
             <a:endParaRPr lang="en-US" sz="2000" dirty="0"/>
           </a:p>
@@ -4352,6 +4314,49 @@
           </a:extLst>
         </p:spPr>
       </p:pic>
+      <p:sp>
+        <p:nvSpPr>
+          <p:cNvPr id="11" name="TextBox 10"/>
+          <p:cNvSpPr txBox="1"/>
+          <p:nvPr/>
+        </p:nvSpPr>
+        <p:spPr>
+          <a:xfrm>
+            <a:off x="2699905" y="1600200"/>
+            <a:ext cx="6063095" cy="4154984"/>
+          </a:xfrm>
+          <a:prstGeom prst="rect">
+            <a:avLst/>
+          </a:prstGeom>
+        </p:spPr>
+        <p:style>
+          <a:lnRef idx="3">
+            <a:schemeClr val="lt1"/>
+          </a:lnRef>
+          <a:fillRef idx="1">
+            <a:schemeClr val="accent6"/>
+          </a:fillRef>
+          <a:effectRef idx="1">
+            <a:schemeClr val="accent6"/>
+          </a:effectRef>
+          <a:fontRef idx="minor">
+            <a:schemeClr val="lt1"/>
+          </a:fontRef>
+        </p:style>
+        <p:txBody>
+          <a:bodyPr wrap="square" rtlCol="0">
+            <a:spAutoFit/>
+          </a:bodyPr>
+          <a:lstStyle/>
+          <a:p>
+            <a:r>
+              <a:rPr lang="en-US" sz="2400" dirty="0" smtClean="0"/>
+              <a:t>Hello Professor [whatever name person signs in with], this is your central page. From here you can go to the rest of where you need to go. If you click on the classes button, it will take you to a page of all the classes you are teaching. If you click Teacher Info, it will take you to a page that tells your general information like your name, your email, your office hours, and anything else you want to add to your info. If you click Student Course History, it will take you to a history showing all the classes you’ve ever taught.  </a:t>
+            </a:r>
+            <a:endParaRPr lang="en-US" sz="2400" dirty="0"/>
+          </a:p>
+        </p:txBody>
+      </p:sp>
     </p:spTree>
     <p:extLst>
       <p:ext uri="{BB962C8B-B14F-4D97-AF65-F5344CB8AC3E}">
@@ -4373,6 +4378,987 @@
 </file>
 
 <file path=ppt/slides/slide3.xml><?xml version="1.0" encoding="utf-8"?>
+<p:sld xmlns:a="http://schemas.openxmlformats.org/drawingml/2006/main" xmlns:r="http://schemas.openxmlformats.org/officeDocument/2006/relationships" xmlns:p="http://schemas.openxmlformats.org/presentationml/2006/main">
+  <p:cSld>
+    <p:spTree>
+      <p:nvGrpSpPr>
+        <p:cNvPr id="1" name=""/>
+        <p:cNvGrpSpPr/>
+        <p:nvPr/>
+      </p:nvGrpSpPr>
+      <p:grpSpPr>
+        <a:xfrm>
+          <a:off x="0" y="0"/>
+          <a:ext cx="0" cy="0"/>
+          <a:chOff x="0" y="0"/>
+          <a:chExt cx="0" cy="0"/>
+        </a:xfrm>
+      </p:grpSpPr>
+      <p:sp>
+        <p:nvSpPr>
+          <p:cNvPr id="3" name="Rectangle 2"/>
+          <p:cNvSpPr/>
+          <p:nvPr/>
+        </p:nvSpPr>
+        <p:spPr>
+          <a:xfrm>
+            <a:off x="0" y="0"/>
+            <a:ext cx="9144000" cy="1216152"/>
+          </a:xfrm>
+          <a:prstGeom prst="rect">
+            <a:avLst/>
+          </a:prstGeom>
+        </p:spPr>
+        <p:style>
+          <a:lnRef idx="2">
+            <a:schemeClr val="accent1">
+              <a:shade val="50000"/>
+            </a:schemeClr>
+          </a:lnRef>
+          <a:fillRef idx="1">
+            <a:schemeClr val="accent1"/>
+          </a:fillRef>
+          <a:effectRef idx="0">
+            <a:schemeClr val="accent1"/>
+          </a:effectRef>
+          <a:fontRef idx="minor">
+            <a:schemeClr val="lt1"/>
+          </a:fontRef>
+        </p:style>
+        <p:txBody>
+          <a:bodyPr rtlCol="0" anchor="ctr"/>
+          <a:lstStyle/>
+          <a:p>
+            <a:pPr algn="ctr"/>
+            <a:endParaRPr lang="en-US"/>
+          </a:p>
+        </p:txBody>
+      </p:sp>
+      <p:sp>
+        <p:nvSpPr>
+          <p:cNvPr id="4" name="TextBox 3"/>
+          <p:cNvSpPr txBox="1"/>
+          <p:nvPr/>
+        </p:nvSpPr>
+        <p:spPr>
+          <a:xfrm>
+            <a:off x="5410200" y="647700"/>
+            <a:ext cx="1755648" cy="369332"/>
+          </a:xfrm>
+          <a:prstGeom prst="rect">
+            <a:avLst/>
+          </a:prstGeom>
+        </p:spPr>
+        <p:style>
+          <a:lnRef idx="0">
+            <a:schemeClr val="accent2"/>
+          </a:lnRef>
+          <a:fillRef idx="3">
+            <a:schemeClr val="accent2"/>
+          </a:fillRef>
+          <a:effectRef idx="3">
+            <a:schemeClr val="accent2"/>
+          </a:effectRef>
+          <a:fontRef idx="minor">
+            <a:schemeClr val="lt1"/>
+          </a:fontRef>
+        </p:style>
+        <p:txBody>
+          <a:bodyPr wrap="square" rtlCol="0">
+            <a:spAutoFit/>
+          </a:bodyPr>
+          <a:lstStyle/>
+          <a:p>
+            <a:r>
+              <a:rPr lang="en-US" dirty="0" smtClean="0"/>
+              <a:t>Aaron Freeland</a:t>
+            </a:r>
+            <a:endParaRPr lang="en-US" dirty="0"/>
+          </a:p>
+        </p:txBody>
+      </p:sp>
+      <p:sp>
+        <p:nvSpPr>
+          <p:cNvPr id="5" name="TextBox 4"/>
+          <p:cNvSpPr txBox="1"/>
+          <p:nvPr/>
+        </p:nvSpPr>
+        <p:spPr>
+          <a:xfrm>
+            <a:off x="7467600" y="647700"/>
+            <a:ext cx="1143000" cy="369332"/>
+          </a:xfrm>
+          <a:prstGeom prst="rect">
+            <a:avLst/>
+          </a:prstGeom>
+        </p:spPr>
+        <p:style>
+          <a:lnRef idx="0">
+            <a:schemeClr val="accent5"/>
+          </a:lnRef>
+          <a:fillRef idx="3">
+            <a:schemeClr val="accent5"/>
+          </a:fillRef>
+          <a:effectRef idx="3">
+            <a:schemeClr val="accent5"/>
+          </a:effectRef>
+          <a:fontRef idx="minor">
+            <a:schemeClr val="lt1"/>
+          </a:fontRef>
+        </p:style>
+        <p:txBody>
+          <a:bodyPr wrap="square" rtlCol="0">
+            <a:spAutoFit/>
+          </a:bodyPr>
+          <a:lstStyle/>
+          <a:p>
+            <a:r>
+              <a:rPr lang="en-US" dirty="0" smtClean="0"/>
+              <a:t>Log out</a:t>
+            </a:r>
+            <a:endParaRPr lang="en-US" dirty="0"/>
+          </a:p>
+        </p:txBody>
+      </p:sp>
+      <p:pic>
+        <p:nvPicPr>
+          <p:cNvPr id="6" name="Picture 2" descr="http://icons.iconarchive.com/icons/artua/mac/512/Home-icon.png"/>
+          <p:cNvPicPr>
+            <a:picLocks noChangeAspect="1" noChangeArrowheads="1"/>
+          </p:cNvPicPr>
+          <p:nvPr/>
+        </p:nvPicPr>
+        <p:blipFill>
+          <a:blip r:embed="rId2" cstate="print">
+            <a:extLst>
+              <a:ext uri="{28A0092B-C50C-407E-A947-70E740481C1C}">
+                <a14:useLocalDpi xmlns:a14="http://schemas.microsoft.com/office/drawing/2010/main" val="0"/>
+              </a:ext>
+            </a:extLst>
+          </a:blip>
+          <a:srcRect/>
+          <a:stretch>
+            <a:fillRect/>
+          </a:stretch>
+        </p:blipFill>
+        <p:spPr bwMode="auto">
+          <a:xfrm>
+            <a:off x="2119746" y="-40470"/>
+            <a:ext cx="1726830" cy="1295123"/>
+          </a:xfrm>
+          <a:prstGeom prst="rect">
+            <a:avLst/>
+          </a:prstGeom>
+          <a:noFill/>
+          <a:extLst>
+            <a:ext uri="{909E8E84-426E-40DD-AFC4-6F175D3DCCD1}">
+              <a14:hiddenFill xmlns:a14="http://schemas.microsoft.com/office/drawing/2010/main">
+                <a:solidFill>
+                  <a:srgbClr val="FFFFFF"/>
+                </a:solidFill>
+              </a14:hiddenFill>
+            </a:ext>
+          </a:extLst>
+        </p:spPr>
+      </p:pic>
+      <p:pic>
+        <p:nvPicPr>
+          <p:cNvPr id="7" name="Picture 2" descr="http://spusurigao.edu.ph/studentportal/Styles/images/gradebook%20icon.png"/>
+          <p:cNvPicPr>
+            <a:picLocks noChangeAspect="1" noChangeArrowheads="1"/>
+          </p:cNvPicPr>
+          <p:nvPr/>
+        </p:nvPicPr>
+        <p:blipFill>
+          <a:blip r:embed="rId3">
+            <a:extLst>
+              <a:ext uri="{28A0092B-C50C-407E-A947-70E740481C1C}">
+                <a14:useLocalDpi xmlns:a14="http://schemas.microsoft.com/office/drawing/2010/main" val="0"/>
+              </a:ext>
+            </a:extLst>
+          </a:blip>
+          <a:srcRect/>
+          <a:stretch>
+            <a:fillRect/>
+          </a:stretch>
+        </p:blipFill>
+        <p:spPr bwMode="auto">
+          <a:xfrm>
+            <a:off x="0" y="76200"/>
+            <a:ext cx="1881620" cy="1143000"/>
+          </a:xfrm>
+          <a:prstGeom prst="rect">
+            <a:avLst/>
+          </a:prstGeom>
+          <a:noFill/>
+          <a:extLst>
+            <a:ext uri="{909E8E84-426E-40DD-AFC4-6F175D3DCCD1}">
+              <a14:hiddenFill xmlns:a14="http://schemas.microsoft.com/office/drawing/2010/main">
+                <a:solidFill>
+                  <a:srgbClr val="FFFFFF"/>
+                </a:solidFill>
+              </a14:hiddenFill>
+            </a:ext>
+          </a:extLst>
+        </p:spPr>
+      </p:pic>
+      <p:sp>
+        <p:nvSpPr>
+          <p:cNvPr id="8" name="Rectangle 7"/>
+          <p:cNvSpPr/>
+          <p:nvPr/>
+        </p:nvSpPr>
+        <p:spPr>
+          <a:xfrm>
+            <a:off x="0" y="1254653"/>
+            <a:ext cx="2362200" cy="5603347"/>
+          </a:xfrm>
+          <a:prstGeom prst="rect">
+            <a:avLst/>
+          </a:prstGeom>
+        </p:spPr>
+        <p:style>
+          <a:lnRef idx="0">
+            <a:schemeClr val="dk1"/>
+          </a:lnRef>
+          <a:fillRef idx="3">
+            <a:schemeClr val="dk1"/>
+          </a:fillRef>
+          <a:effectRef idx="3">
+            <a:schemeClr val="dk1"/>
+          </a:effectRef>
+          <a:fontRef idx="minor">
+            <a:schemeClr val="lt1"/>
+          </a:fontRef>
+        </p:style>
+        <p:txBody>
+          <a:bodyPr rtlCol="0" anchor="ctr"/>
+          <a:lstStyle/>
+          <a:p>
+            <a:pPr algn="ctr"/>
+            <a:endParaRPr lang="en-US"/>
+          </a:p>
+        </p:txBody>
+      </p:sp>
+      <p:sp>
+        <p:nvSpPr>
+          <p:cNvPr id="9" name="TextBox 8"/>
+          <p:cNvSpPr txBox="1"/>
+          <p:nvPr/>
+        </p:nvSpPr>
+        <p:spPr>
+          <a:xfrm>
+            <a:off x="228600" y="1600200"/>
+            <a:ext cx="1905000" cy="523220"/>
+          </a:xfrm>
+          <a:prstGeom prst="rect">
+            <a:avLst/>
+          </a:prstGeom>
+        </p:spPr>
+        <p:style>
+          <a:lnRef idx="0">
+            <a:schemeClr val="accent4"/>
+          </a:lnRef>
+          <a:fillRef idx="3">
+            <a:schemeClr val="accent4"/>
+          </a:fillRef>
+          <a:effectRef idx="3">
+            <a:schemeClr val="accent4"/>
+          </a:effectRef>
+          <a:fontRef idx="minor">
+            <a:schemeClr val="lt1"/>
+          </a:fontRef>
+        </p:style>
+        <p:txBody>
+          <a:bodyPr wrap="square" rtlCol="0">
+            <a:spAutoFit/>
+          </a:bodyPr>
+          <a:lstStyle/>
+          <a:p>
+            <a:pPr algn="ctr"/>
+            <a:r>
+              <a:rPr lang="en-US" sz="2800" dirty="0" smtClean="0"/>
+              <a:t>Classes</a:t>
+            </a:r>
+            <a:endParaRPr lang="en-US" sz="2800" dirty="0"/>
+          </a:p>
+        </p:txBody>
+      </p:sp>
+      <p:sp>
+        <p:nvSpPr>
+          <p:cNvPr id="11" name="TextBox 10"/>
+          <p:cNvSpPr txBox="1"/>
+          <p:nvPr/>
+        </p:nvSpPr>
+        <p:spPr>
+          <a:xfrm>
+            <a:off x="235527" y="3615035"/>
+            <a:ext cx="1905000" cy="461665"/>
+          </a:xfrm>
+          <a:prstGeom prst="rect">
+            <a:avLst/>
+          </a:prstGeom>
+        </p:spPr>
+        <p:style>
+          <a:lnRef idx="0">
+            <a:schemeClr val="accent4"/>
+          </a:lnRef>
+          <a:fillRef idx="3">
+            <a:schemeClr val="accent4"/>
+          </a:fillRef>
+          <a:effectRef idx="3">
+            <a:schemeClr val="accent4"/>
+          </a:effectRef>
+          <a:fontRef idx="minor">
+            <a:schemeClr val="lt1"/>
+          </a:fontRef>
+        </p:style>
+        <p:txBody>
+          <a:bodyPr wrap="square" rtlCol="0">
+            <a:spAutoFit/>
+          </a:bodyPr>
+          <a:lstStyle/>
+          <a:p>
+            <a:pPr algn="ctr"/>
+            <a:r>
+              <a:rPr lang="en-US" sz="2400" dirty="0" smtClean="0"/>
+              <a:t>Teacher Info</a:t>
+            </a:r>
+            <a:endParaRPr lang="en-US" sz="2400" dirty="0"/>
+          </a:p>
+        </p:txBody>
+      </p:sp>
+      <p:sp>
+        <p:nvSpPr>
+          <p:cNvPr id="12" name="TextBox 11"/>
+          <p:cNvSpPr txBox="1"/>
+          <p:nvPr/>
+        </p:nvSpPr>
+        <p:spPr>
+          <a:xfrm>
+            <a:off x="221673" y="5535543"/>
+            <a:ext cx="1898073" cy="707886"/>
+          </a:xfrm>
+          <a:prstGeom prst="rect">
+            <a:avLst/>
+          </a:prstGeom>
+        </p:spPr>
+        <p:style>
+          <a:lnRef idx="0">
+            <a:schemeClr val="accent4"/>
+          </a:lnRef>
+          <a:fillRef idx="3">
+            <a:schemeClr val="accent4"/>
+          </a:fillRef>
+          <a:effectRef idx="3">
+            <a:schemeClr val="accent4"/>
+          </a:effectRef>
+          <a:fontRef idx="minor">
+            <a:schemeClr val="lt1"/>
+          </a:fontRef>
+        </p:style>
+        <p:txBody>
+          <a:bodyPr wrap="square" rtlCol="0">
+            <a:spAutoFit/>
+          </a:bodyPr>
+          <a:lstStyle/>
+          <a:p>
+            <a:pPr algn="ctr"/>
+            <a:r>
+              <a:rPr lang="en-US" sz="2000" dirty="0" smtClean="0"/>
+              <a:t>Teacher Course History</a:t>
+            </a:r>
+            <a:endParaRPr lang="en-US" sz="2000" dirty="0"/>
+          </a:p>
+        </p:txBody>
+      </p:sp>
+      <p:graphicFrame>
+        <p:nvGraphicFramePr>
+          <p:cNvPr id="13" name="Table 12"/>
+          <p:cNvGraphicFramePr>
+            <a:graphicFrameLocks noGrp="1"/>
+          </p:cNvGraphicFramePr>
+          <p:nvPr>
+            <p:extLst>
+              <p:ext uri="{D42A27DB-BD31-4B8C-83A1-F6EECF244321}">
+                <p14:modId xmlns:p14="http://schemas.microsoft.com/office/powerpoint/2010/main" val="375725391"/>
+              </p:ext>
+            </p:extLst>
+          </p:nvPr>
+        </p:nvGraphicFramePr>
+        <p:xfrm>
+          <a:off x="2743200" y="1447802"/>
+          <a:ext cx="6096000" cy="5087028"/>
+        </p:xfrm>
+        <a:graphic>
+          <a:graphicData uri="http://schemas.openxmlformats.org/drawingml/2006/table">
+            <a:tbl>
+              <a:tblPr firstRow="1" bandRow="1">
+                <a:tableStyleId>{5C22544A-7EE6-4342-B048-85BDC9FD1C3A}</a:tableStyleId>
+              </a:tblPr>
+              <a:tblGrid>
+                <a:gridCol w="1219200"/>
+                <a:gridCol w="812800"/>
+                <a:gridCol w="1016000"/>
+                <a:gridCol w="1016000"/>
+                <a:gridCol w="1016000"/>
+                <a:gridCol w="1016000"/>
+              </a:tblGrid>
+              <a:tr h="696279">
+                <a:tc>
+                  <a:txBody>
+                    <a:bodyPr/>
+                    <a:lstStyle/>
+                    <a:p>
+                      <a:r>
+                        <a:rPr lang="en-US" dirty="0" smtClean="0"/>
+                        <a:t>Class Name</a:t>
+                      </a:r>
+                      <a:endParaRPr lang="en-US" dirty="0"/>
+                    </a:p>
+                  </a:txBody>
+                  <a:tcPr/>
+                </a:tc>
+                <a:tc>
+                  <a:txBody>
+                    <a:bodyPr/>
+                    <a:lstStyle/>
+                    <a:p>
+                      <a:r>
+                        <a:rPr lang="en-US" dirty="0" smtClean="0"/>
+                        <a:t>Class Day</a:t>
+                      </a:r>
+                      <a:endParaRPr lang="en-US" dirty="0"/>
+                    </a:p>
+                  </a:txBody>
+                  <a:tcPr/>
+                </a:tc>
+                <a:tc>
+                  <a:txBody>
+                    <a:bodyPr/>
+                    <a:lstStyle/>
+                    <a:p>
+                      <a:r>
+                        <a:rPr lang="en-US" dirty="0" smtClean="0"/>
+                        <a:t>Class Time</a:t>
+                      </a:r>
+                      <a:endParaRPr lang="en-US" dirty="0"/>
+                    </a:p>
+                  </a:txBody>
+                  <a:tcPr/>
+                </a:tc>
+                <a:tc>
+                  <a:txBody>
+                    <a:bodyPr/>
+                    <a:lstStyle/>
+                    <a:p>
+                      <a:r>
+                        <a:rPr lang="en-US" sz="1600" dirty="0" smtClean="0"/>
+                        <a:t>Class Location</a:t>
+                      </a:r>
+                      <a:endParaRPr lang="en-US" sz="1600" dirty="0"/>
+                    </a:p>
+                  </a:txBody>
+                  <a:tcPr/>
+                </a:tc>
+                <a:tc>
+                  <a:txBody>
+                    <a:bodyPr/>
+                    <a:lstStyle/>
+                    <a:p>
+                      <a:r>
+                        <a:rPr lang="en-US" dirty="0" smtClean="0"/>
+                        <a:t>Class CRN#</a:t>
+                      </a:r>
+                      <a:endParaRPr lang="en-US" dirty="0"/>
+                    </a:p>
+                  </a:txBody>
+                  <a:tcPr/>
+                </a:tc>
+                <a:tc>
+                  <a:txBody>
+                    <a:bodyPr/>
+                    <a:lstStyle/>
+                    <a:p>
+                      <a:r>
+                        <a:rPr lang="en-US" sz="1600" dirty="0" smtClean="0"/>
+                        <a:t>Class Category</a:t>
+                      </a:r>
+                      <a:endParaRPr lang="en-US" sz="1600" dirty="0"/>
+                    </a:p>
+                  </a:txBody>
+                  <a:tcPr/>
+                </a:tc>
+              </a:tr>
+              <a:tr h="1132519">
+                <a:tc>
+                  <a:txBody>
+                    <a:bodyPr/>
+                    <a:lstStyle/>
+                    <a:p>
+                      <a:r>
+                        <a:rPr lang="en-US" dirty="0" smtClean="0"/>
+                        <a:t>Advanced Web Design</a:t>
+                      </a:r>
+                      <a:endParaRPr lang="en-US" dirty="0"/>
+                    </a:p>
+                  </a:txBody>
+                  <a:tcPr/>
+                </a:tc>
+                <a:tc>
+                  <a:txBody>
+                    <a:bodyPr/>
+                    <a:lstStyle/>
+                    <a:p>
+                      <a:r>
+                        <a:rPr lang="en-US" dirty="0" smtClean="0"/>
+                        <a:t>TR</a:t>
+                      </a:r>
+                      <a:endParaRPr lang="en-US" dirty="0"/>
+                    </a:p>
+                  </a:txBody>
+                  <a:tcPr/>
+                </a:tc>
+                <a:tc>
+                  <a:txBody>
+                    <a:bodyPr/>
+                    <a:lstStyle/>
+                    <a:p>
+                      <a:r>
+                        <a:rPr lang="en-US" dirty="0" smtClean="0"/>
+                        <a:t>4:30</a:t>
+                      </a:r>
+                      <a:r>
+                        <a:rPr lang="en-US" baseline="0" dirty="0" smtClean="0"/>
+                        <a:t> – 6:59</a:t>
+                      </a:r>
+                      <a:endParaRPr lang="en-US" dirty="0"/>
+                    </a:p>
+                  </a:txBody>
+                  <a:tcPr/>
+                </a:tc>
+                <a:tc>
+                  <a:txBody>
+                    <a:bodyPr/>
+                    <a:lstStyle/>
+                    <a:p>
+                      <a:r>
+                        <a:rPr lang="en-US" dirty="0" smtClean="0"/>
+                        <a:t>CC</a:t>
+                      </a:r>
+                      <a:r>
+                        <a:rPr lang="en-US" baseline="0" dirty="0" smtClean="0"/>
+                        <a:t> 127</a:t>
+                      </a:r>
+                      <a:endParaRPr lang="en-US" dirty="0"/>
+                    </a:p>
+                  </a:txBody>
+                  <a:tcPr/>
+                </a:tc>
+                <a:tc>
+                  <a:txBody>
+                    <a:bodyPr/>
+                    <a:lstStyle/>
+                    <a:p>
+                      <a:endParaRPr lang="en-US" dirty="0"/>
+                    </a:p>
+                  </a:txBody>
+                  <a:tcPr/>
+                </a:tc>
+                <a:tc>
+                  <a:txBody>
+                    <a:bodyPr/>
+                    <a:lstStyle/>
+                    <a:p>
+                      <a:r>
+                        <a:rPr lang="en-US" dirty="0" smtClean="0"/>
+                        <a:t>CS</a:t>
+                      </a:r>
+                      <a:endParaRPr lang="en-US" dirty="0"/>
+                    </a:p>
+                  </a:txBody>
+                  <a:tcPr/>
+                </a:tc>
+              </a:tr>
+              <a:tr h="651646">
+                <a:tc>
+                  <a:txBody>
+                    <a:bodyPr/>
+                    <a:lstStyle/>
+                    <a:p>
+                      <a:endParaRPr lang="en-US"/>
+                    </a:p>
+                  </a:txBody>
+                  <a:tcPr/>
+                </a:tc>
+                <a:tc>
+                  <a:txBody>
+                    <a:bodyPr/>
+                    <a:lstStyle/>
+                    <a:p>
+                      <a:endParaRPr lang="en-US"/>
+                    </a:p>
+                  </a:txBody>
+                  <a:tcPr/>
+                </a:tc>
+                <a:tc>
+                  <a:txBody>
+                    <a:bodyPr/>
+                    <a:lstStyle/>
+                    <a:p>
+                      <a:endParaRPr lang="en-US"/>
+                    </a:p>
+                  </a:txBody>
+                  <a:tcPr/>
+                </a:tc>
+                <a:tc>
+                  <a:txBody>
+                    <a:bodyPr/>
+                    <a:lstStyle/>
+                    <a:p>
+                      <a:endParaRPr lang="en-US"/>
+                    </a:p>
+                  </a:txBody>
+                  <a:tcPr/>
+                </a:tc>
+                <a:tc>
+                  <a:txBody>
+                    <a:bodyPr/>
+                    <a:lstStyle/>
+                    <a:p>
+                      <a:endParaRPr lang="en-US"/>
+                    </a:p>
+                  </a:txBody>
+                  <a:tcPr/>
+                </a:tc>
+                <a:tc>
+                  <a:txBody>
+                    <a:bodyPr/>
+                    <a:lstStyle/>
+                    <a:p>
+                      <a:endParaRPr lang="en-US"/>
+                    </a:p>
+                  </a:txBody>
+                  <a:tcPr/>
+                </a:tc>
+              </a:tr>
+              <a:tr h="651646">
+                <a:tc>
+                  <a:txBody>
+                    <a:bodyPr/>
+                    <a:lstStyle/>
+                    <a:p>
+                      <a:endParaRPr lang="en-US"/>
+                    </a:p>
+                  </a:txBody>
+                  <a:tcPr/>
+                </a:tc>
+                <a:tc>
+                  <a:txBody>
+                    <a:bodyPr/>
+                    <a:lstStyle/>
+                    <a:p>
+                      <a:endParaRPr lang="en-US"/>
+                    </a:p>
+                  </a:txBody>
+                  <a:tcPr/>
+                </a:tc>
+                <a:tc>
+                  <a:txBody>
+                    <a:bodyPr/>
+                    <a:lstStyle/>
+                    <a:p>
+                      <a:endParaRPr lang="en-US"/>
+                    </a:p>
+                  </a:txBody>
+                  <a:tcPr/>
+                </a:tc>
+                <a:tc>
+                  <a:txBody>
+                    <a:bodyPr/>
+                    <a:lstStyle/>
+                    <a:p>
+                      <a:endParaRPr lang="en-US"/>
+                    </a:p>
+                  </a:txBody>
+                  <a:tcPr/>
+                </a:tc>
+                <a:tc>
+                  <a:txBody>
+                    <a:bodyPr/>
+                    <a:lstStyle/>
+                    <a:p>
+                      <a:endParaRPr lang="en-US"/>
+                    </a:p>
+                  </a:txBody>
+                  <a:tcPr/>
+                </a:tc>
+                <a:tc>
+                  <a:txBody>
+                    <a:bodyPr/>
+                    <a:lstStyle/>
+                    <a:p>
+                      <a:endParaRPr lang="en-US"/>
+                    </a:p>
+                  </a:txBody>
+                  <a:tcPr/>
+                </a:tc>
+              </a:tr>
+              <a:tr h="651646">
+                <a:tc>
+                  <a:txBody>
+                    <a:bodyPr/>
+                    <a:lstStyle/>
+                    <a:p>
+                      <a:endParaRPr lang="en-US"/>
+                    </a:p>
+                  </a:txBody>
+                  <a:tcPr/>
+                </a:tc>
+                <a:tc>
+                  <a:txBody>
+                    <a:bodyPr/>
+                    <a:lstStyle/>
+                    <a:p>
+                      <a:endParaRPr lang="en-US"/>
+                    </a:p>
+                  </a:txBody>
+                  <a:tcPr/>
+                </a:tc>
+                <a:tc>
+                  <a:txBody>
+                    <a:bodyPr/>
+                    <a:lstStyle/>
+                    <a:p>
+                      <a:endParaRPr lang="en-US"/>
+                    </a:p>
+                  </a:txBody>
+                  <a:tcPr/>
+                </a:tc>
+                <a:tc>
+                  <a:txBody>
+                    <a:bodyPr/>
+                    <a:lstStyle/>
+                    <a:p>
+                      <a:endParaRPr lang="en-US"/>
+                    </a:p>
+                  </a:txBody>
+                  <a:tcPr/>
+                </a:tc>
+                <a:tc>
+                  <a:txBody>
+                    <a:bodyPr/>
+                    <a:lstStyle/>
+                    <a:p>
+                      <a:endParaRPr lang="en-US"/>
+                    </a:p>
+                  </a:txBody>
+                  <a:tcPr/>
+                </a:tc>
+                <a:tc>
+                  <a:txBody>
+                    <a:bodyPr/>
+                    <a:lstStyle/>
+                    <a:p>
+                      <a:endParaRPr lang="en-US"/>
+                    </a:p>
+                  </a:txBody>
+                  <a:tcPr/>
+                </a:tc>
+              </a:tr>
+              <a:tr h="651646">
+                <a:tc>
+                  <a:txBody>
+                    <a:bodyPr/>
+                    <a:lstStyle/>
+                    <a:p>
+                      <a:endParaRPr lang="en-US"/>
+                    </a:p>
+                  </a:txBody>
+                  <a:tcPr/>
+                </a:tc>
+                <a:tc>
+                  <a:txBody>
+                    <a:bodyPr/>
+                    <a:lstStyle/>
+                    <a:p>
+                      <a:endParaRPr lang="en-US"/>
+                    </a:p>
+                  </a:txBody>
+                  <a:tcPr/>
+                </a:tc>
+                <a:tc>
+                  <a:txBody>
+                    <a:bodyPr/>
+                    <a:lstStyle/>
+                    <a:p>
+                      <a:endParaRPr lang="en-US"/>
+                    </a:p>
+                  </a:txBody>
+                  <a:tcPr/>
+                </a:tc>
+                <a:tc>
+                  <a:txBody>
+                    <a:bodyPr/>
+                    <a:lstStyle/>
+                    <a:p>
+                      <a:endParaRPr lang="en-US"/>
+                    </a:p>
+                  </a:txBody>
+                  <a:tcPr/>
+                </a:tc>
+                <a:tc>
+                  <a:txBody>
+                    <a:bodyPr/>
+                    <a:lstStyle/>
+                    <a:p>
+                      <a:endParaRPr lang="en-US"/>
+                    </a:p>
+                  </a:txBody>
+                  <a:tcPr/>
+                </a:tc>
+                <a:tc>
+                  <a:txBody>
+                    <a:bodyPr/>
+                    <a:lstStyle/>
+                    <a:p>
+                      <a:endParaRPr lang="en-US"/>
+                    </a:p>
+                  </a:txBody>
+                  <a:tcPr/>
+                </a:tc>
+              </a:tr>
+              <a:tr h="651646">
+                <a:tc>
+                  <a:txBody>
+                    <a:bodyPr/>
+                    <a:lstStyle/>
+                    <a:p>
+                      <a:endParaRPr lang="en-US"/>
+                    </a:p>
+                  </a:txBody>
+                  <a:tcPr/>
+                </a:tc>
+                <a:tc>
+                  <a:txBody>
+                    <a:bodyPr/>
+                    <a:lstStyle/>
+                    <a:p>
+                      <a:endParaRPr lang="en-US"/>
+                    </a:p>
+                  </a:txBody>
+                  <a:tcPr/>
+                </a:tc>
+                <a:tc>
+                  <a:txBody>
+                    <a:bodyPr/>
+                    <a:lstStyle/>
+                    <a:p>
+                      <a:endParaRPr lang="en-US"/>
+                    </a:p>
+                  </a:txBody>
+                  <a:tcPr/>
+                </a:tc>
+                <a:tc>
+                  <a:txBody>
+                    <a:bodyPr/>
+                    <a:lstStyle/>
+                    <a:p>
+                      <a:endParaRPr lang="en-US" dirty="0"/>
+                    </a:p>
+                  </a:txBody>
+                  <a:tcPr/>
+                </a:tc>
+                <a:tc>
+                  <a:txBody>
+                    <a:bodyPr/>
+                    <a:lstStyle/>
+                    <a:p>
+                      <a:endParaRPr lang="en-US"/>
+                    </a:p>
+                  </a:txBody>
+                  <a:tcPr/>
+                </a:tc>
+                <a:tc>
+                  <a:txBody>
+                    <a:bodyPr/>
+                    <a:lstStyle/>
+                    <a:p>
+                      <a:endParaRPr lang="en-US" dirty="0"/>
+                    </a:p>
+                  </a:txBody>
+                  <a:tcPr/>
+                </a:tc>
+              </a:tr>
+            </a:tbl>
+          </a:graphicData>
+        </a:graphic>
+      </p:graphicFrame>
+      <p:sp>
+        <p:nvSpPr>
+          <p:cNvPr id="14" name="TextBox 13"/>
+          <p:cNvSpPr txBox="1"/>
+          <p:nvPr/>
+        </p:nvSpPr>
+        <p:spPr>
+          <a:xfrm>
+            <a:off x="235526" y="2514599"/>
+            <a:ext cx="1901952" cy="521208"/>
+          </a:xfrm>
+          <a:prstGeom prst="rect">
+            <a:avLst/>
+          </a:prstGeom>
+        </p:spPr>
+        <p:style>
+          <a:lnRef idx="0">
+            <a:schemeClr val="accent4"/>
+          </a:lnRef>
+          <a:fillRef idx="3">
+            <a:schemeClr val="accent4"/>
+          </a:fillRef>
+          <a:effectRef idx="3">
+            <a:schemeClr val="accent4"/>
+          </a:effectRef>
+          <a:fontRef idx="minor">
+            <a:schemeClr val="lt1"/>
+          </a:fontRef>
+        </p:style>
+        <p:txBody>
+          <a:bodyPr wrap="square" rtlCol="0">
+            <a:spAutoFit/>
+          </a:bodyPr>
+          <a:lstStyle/>
+          <a:p>
+            <a:pPr algn="ctr"/>
+            <a:r>
+              <a:rPr lang="en-US" sz="2400" dirty="0" smtClean="0"/>
+              <a:t>Grades</a:t>
+            </a:r>
+            <a:endParaRPr lang="en-US" sz="2400" dirty="0"/>
+          </a:p>
+        </p:txBody>
+      </p:sp>
+    </p:spTree>
+    <p:extLst>
+      <p:ext uri="{BB962C8B-B14F-4D97-AF65-F5344CB8AC3E}">
+        <p14:creationId xmlns:p14="http://schemas.microsoft.com/office/powerpoint/2010/main" val="2562063900"/>
+      </p:ext>
+    </p:extLst>
+  </p:cSld>
+  <p:clrMapOvr>
+    <a:masterClrMapping/>
+  </p:clrMapOvr>
+  <p:timing>
+    <p:tnLst>
+      <p:par>
+        <p:cTn id="1" dur="indefinite" restart="never" nodeType="tmRoot"/>
+      </p:par>
+    </p:tnLst>
+  </p:timing>
+</p:sld>
+</file>
+
+<file path=ppt/slides/slide4.xml><?xml version="1.0" encoding="utf-8"?>
 <p:sld xmlns:a="http://schemas.openxmlformats.org/drawingml/2006/main" xmlns:r="http://schemas.openxmlformats.org/officeDocument/2006/relationships" xmlns:p="http://schemas.openxmlformats.org/presentationml/2006/main">
   <p:cSld>
     <p:spTree>

</xml_diff>